<commit_message>
- Updated presentation by adding new e-mail
- Added dummy file
</commit_message>
<xml_diff>
--- a/01-Introduction-into-Course.pptx
+++ b/01-Introduction-into-Course.pptx
@@ -3919,7 +3919,9 @@
           </a:xfrm>
         </p:spPr>
         <p:txBody>
-          <a:bodyPr/>
+          <a:bodyPr>
+            <a:normAutofit lnSpcReduction="10000"/>
+          </a:bodyPr>
           <a:lstStyle/>
           <a:p>
             <a:pPr>
@@ -4023,6 +4025,32 @@
                 </a:solidFill>
               </a:rPr>
               <a:t>com</a:t>
+            </a:r>
+          </a:p>
+          <a:p>
+            <a:pPr>
+              <a:buFont typeface="Wingdings" panose="05000000000000000000" pitchFamily="2" charset="2"/>
+              <a:buChar char="§"/>
+            </a:pPr>
+            <a:r>
+              <a:rPr lang="bg-BG" dirty="0" smtClean="0">
+                <a:solidFill>
+                  <a:schemeClr val="bg1">
+                    <a:lumMod val="95000"/>
+                  </a:schemeClr>
+                </a:solidFill>
+              </a:rPr>
+              <a:t>Академия Е-поща: </a:t>
+            </a:r>
+            <a:r>
+              <a:rPr lang="en-US" dirty="0" smtClean="0">
+                <a:solidFill>
+                  <a:schemeClr val="bg1">
+                    <a:lumMod val="95000"/>
+                  </a:schemeClr>
+                </a:solidFill>
+              </a:rPr>
+              <a:t>student [at] soft-intellect [dot] com</a:t>
             </a:r>
             <a:endParaRPr lang="bg-BG" dirty="0">
               <a:solidFill>

</xml_diff>

<commit_message>
Updated Lecture 2, 3 and 3 plus samples.
</commit_message>
<xml_diff>
--- a/01-Introduction-into-Course.pptx
+++ b/01-Introduction-into-Course.pptx
@@ -14,6 +14,7 @@
     <p:sldId id="263" r:id="rId8"/>
     <p:sldId id="260" r:id="rId9"/>
     <p:sldId id="261" r:id="rId10"/>
+    <p:sldId id="265" r:id="rId11"/>
   </p:sldIdLst>
   <p:sldSz cx="9144000" cy="6858000" type="screen4x3"/>
   <p:notesSz cx="6858000" cy="9144000"/>
@@ -312,7 +313,7 @@
           <a:p>
             <a:fld id="{3EA744D9-3FBE-48D8-BF2A-85DF203E4D20}" type="datetimeFigureOut">
               <a:rPr lang="bg-BG" smtClean="0"/>
-              <a:t>18.11.2015 г.</a:t>
+              <a:t>29.11.2015 г.</a:t>
             </a:fld>
             <a:endParaRPr lang="bg-BG"/>
           </a:p>
@@ -482,7 +483,7 @@
           <a:p>
             <a:fld id="{3EA744D9-3FBE-48D8-BF2A-85DF203E4D20}" type="datetimeFigureOut">
               <a:rPr lang="bg-BG" smtClean="0"/>
-              <a:t>18.11.2015 г.</a:t>
+              <a:t>29.11.2015 г.</a:t>
             </a:fld>
             <a:endParaRPr lang="bg-BG"/>
           </a:p>
@@ -662,7 +663,7 @@
           <a:p>
             <a:fld id="{3EA744D9-3FBE-48D8-BF2A-85DF203E4D20}" type="datetimeFigureOut">
               <a:rPr lang="bg-BG" smtClean="0"/>
-              <a:t>18.11.2015 г.</a:t>
+              <a:t>29.11.2015 г.</a:t>
             </a:fld>
             <a:endParaRPr lang="bg-BG"/>
           </a:p>
@@ -832,7 +833,7 @@
           <a:p>
             <a:fld id="{3EA744D9-3FBE-48D8-BF2A-85DF203E4D20}" type="datetimeFigureOut">
               <a:rPr lang="bg-BG" smtClean="0"/>
-              <a:t>18.11.2015 г.</a:t>
+              <a:t>29.11.2015 г.</a:t>
             </a:fld>
             <a:endParaRPr lang="bg-BG"/>
           </a:p>
@@ -1078,7 +1079,7 @@
           <a:p>
             <a:fld id="{3EA744D9-3FBE-48D8-BF2A-85DF203E4D20}" type="datetimeFigureOut">
               <a:rPr lang="bg-BG" smtClean="0"/>
-              <a:t>18.11.2015 г.</a:t>
+              <a:t>29.11.2015 г.</a:t>
             </a:fld>
             <a:endParaRPr lang="bg-BG"/>
           </a:p>
@@ -1366,7 +1367,7 @@
           <a:p>
             <a:fld id="{3EA744D9-3FBE-48D8-BF2A-85DF203E4D20}" type="datetimeFigureOut">
               <a:rPr lang="bg-BG" smtClean="0"/>
-              <a:t>18.11.2015 г.</a:t>
+              <a:t>29.11.2015 г.</a:t>
             </a:fld>
             <a:endParaRPr lang="bg-BG"/>
           </a:p>
@@ -1788,7 +1789,7 @@
           <a:p>
             <a:fld id="{3EA744D9-3FBE-48D8-BF2A-85DF203E4D20}" type="datetimeFigureOut">
               <a:rPr lang="bg-BG" smtClean="0"/>
-              <a:t>18.11.2015 г.</a:t>
+              <a:t>29.11.2015 г.</a:t>
             </a:fld>
             <a:endParaRPr lang="bg-BG"/>
           </a:p>
@@ -1906,7 +1907,7 @@
           <a:p>
             <a:fld id="{3EA744D9-3FBE-48D8-BF2A-85DF203E4D20}" type="datetimeFigureOut">
               <a:rPr lang="bg-BG" smtClean="0"/>
-              <a:t>18.11.2015 г.</a:t>
+              <a:t>29.11.2015 г.</a:t>
             </a:fld>
             <a:endParaRPr lang="bg-BG"/>
           </a:p>
@@ -2001,7 +2002,7 @@
           <a:p>
             <a:fld id="{3EA744D9-3FBE-48D8-BF2A-85DF203E4D20}" type="datetimeFigureOut">
               <a:rPr lang="bg-BG" smtClean="0"/>
-              <a:t>18.11.2015 г.</a:t>
+              <a:t>29.11.2015 г.</a:t>
             </a:fld>
             <a:endParaRPr lang="bg-BG"/>
           </a:p>
@@ -2278,7 +2279,7 @@
           <a:p>
             <a:fld id="{3EA744D9-3FBE-48D8-BF2A-85DF203E4D20}" type="datetimeFigureOut">
               <a:rPr lang="bg-BG" smtClean="0"/>
-              <a:t>18.11.2015 г.</a:t>
+              <a:t>29.11.2015 г.</a:t>
             </a:fld>
             <a:endParaRPr lang="bg-BG"/>
           </a:p>
@@ -2531,7 +2532,7 @@
           <a:p>
             <a:fld id="{3EA744D9-3FBE-48D8-BF2A-85DF203E4D20}" type="datetimeFigureOut">
               <a:rPr lang="bg-BG" smtClean="0"/>
-              <a:t>18.11.2015 г.</a:t>
+              <a:t>29.11.2015 г.</a:t>
             </a:fld>
             <a:endParaRPr lang="bg-BG"/>
           </a:p>
@@ -2753,7 +2754,7 @@
           <a:p>
             <a:fld id="{3EA744D9-3FBE-48D8-BF2A-85DF203E4D20}" type="datetimeFigureOut">
               <a:rPr lang="bg-BG" smtClean="0"/>
-              <a:t>18.11.2015 г.</a:t>
+              <a:t>29.11.2015 г.</a:t>
             </a:fld>
             <a:endParaRPr lang="bg-BG"/>
           </a:p>
@@ -3209,6 +3210,196 @@
     <p:extLst>
       <p:ext uri="{BB962C8B-B14F-4D97-AF65-F5344CB8AC3E}">
         <p14:creationId xmlns:p14="http://schemas.microsoft.com/office/powerpoint/2010/main" val="2032689186"/>
+      </p:ext>
+    </p:extLst>
+  </p:cSld>
+  <p:clrMapOvr>
+    <a:masterClrMapping/>
+  </p:clrMapOvr>
+  <p:timing>
+    <p:tnLst>
+      <p:par>
+        <p:cTn id="1" dur="indefinite" restart="never" nodeType="tmRoot"/>
+      </p:par>
+    </p:tnLst>
+  </p:timing>
+</p:sld>
+</file>
+
+<file path=ppt/slides/slide10.xml><?xml version="1.0" encoding="utf-8"?>
+<p:sld xmlns:a="http://schemas.openxmlformats.org/drawingml/2006/main" xmlns:r="http://schemas.openxmlformats.org/officeDocument/2006/relationships" xmlns:p="http://schemas.openxmlformats.org/presentationml/2006/main">
+  <p:cSld>
+    <p:spTree>
+      <p:nvGrpSpPr>
+        <p:cNvPr id="1" name=""/>
+        <p:cNvGrpSpPr/>
+        <p:nvPr/>
+      </p:nvGrpSpPr>
+      <p:grpSpPr>
+        <a:xfrm>
+          <a:off x="0" y="0"/>
+          <a:ext cx="0" cy="0"/>
+          <a:chOff x="0" y="0"/>
+          <a:chExt cx="0" cy="0"/>
+        </a:xfrm>
+      </p:grpSpPr>
+      <p:sp>
+        <p:nvSpPr>
+          <p:cNvPr id="2" name="Title 1"/>
+          <p:cNvSpPr>
+            <a:spLocks noGrp="1"/>
+          </p:cNvSpPr>
+          <p:nvPr>
+            <p:ph type="title"/>
+          </p:nvPr>
+        </p:nvSpPr>
+        <p:spPr>
+          <a:xfrm>
+            <a:off x="838200" y="685800"/>
+            <a:ext cx="8229600" cy="1143000"/>
+          </a:xfrm>
+        </p:spPr>
+        <p:txBody>
+          <a:bodyPr/>
+          <a:lstStyle/>
+          <a:p>
+            <a:pPr algn="l"/>
+            <a:r>
+              <a:rPr lang="bg-BG" dirty="0" smtClean="0">
+                <a:solidFill>
+                  <a:schemeClr val="accent6"/>
+                </a:solidFill>
+              </a:rPr>
+              <a:t>Въпроси</a:t>
+            </a:r>
+            <a:endParaRPr lang="bg-BG" dirty="0">
+              <a:solidFill>
+                <a:schemeClr val="accent6"/>
+              </a:solidFill>
+            </a:endParaRPr>
+          </a:p>
+        </p:txBody>
+      </p:sp>
+      <p:sp>
+        <p:nvSpPr>
+          <p:cNvPr id="3" name="Content Placeholder 2"/>
+          <p:cNvSpPr>
+            <a:spLocks noGrp="1"/>
+          </p:cNvSpPr>
+          <p:nvPr>
+            <p:ph idx="1"/>
+          </p:nvPr>
+        </p:nvSpPr>
+        <p:spPr>
+          <a:xfrm>
+            <a:off x="762000" y="1676400"/>
+            <a:ext cx="7620000" cy="4525963"/>
+          </a:xfrm>
+        </p:spPr>
+        <p:txBody>
+          <a:bodyPr>
+            <a:normAutofit/>
+          </a:bodyPr>
+          <a:lstStyle/>
+          <a:p>
+            <a:pPr>
+              <a:buFont typeface="Wingdings" panose="05000000000000000000" pitchFamily="2" charset="2"/>
+              <a:buChar char="§"/>
+            </a:pPr>
+            <a:endParaRPr lang="en-US" dirty="0">
+              <a:solidFill>
+                <a:schemeClr val="bg1">
+                  <a:lumMod val="95000"/>
+                </a:schemeClr>
+              </a:solidFill>
+            </a:endParaRPr>
+          </a:p>
+          <a:p>
+            <a:pPr>
+              <a:buFont typeface="Wingdings" panose="05000000000000000000" pitchFamily="2" charset="2"/>
+              <a:buChar char="§"/>
+            </a:pPr>
+            <a:endParaRPr lang="en-US" dirty="0">
+              <a:solidFill>
+                <a:schemeClr val="bg1">
+                  <a:lumMod val="95000"/>
+                </a:schemeClr>
+              </a:solidFill>
+            </a:endParaRPr>
+          </a:p>
+          <a:p>
+            <a:pPr>
+              <a:buFont typeface="Wingdings" panose="05000000000000000000" pitchFamily="2" charset="2"/>
+              <a:buChar char="§"/>
+            </a:pPr>
+            <a:endParaRPr lang="en-US" dirty="0">
+              <a:solidFill>
+                <a:schemeClr val="bg1">
+                  <a:lumMod val="95000"/>
+                </a:schemeClr>
+              </a:solidFill>
+            </a:endParaRPr>
+          </a:p>
+          <a:p>
+            <a:pPr>
+              <a:buFont typeface="Wingdings" panose="05000000000000000000" pitchFamily="2" charset="2"/>
+              <a:buChar char="§"/>
+            </a:pPr>
+            <a:endParaRPr lang="en-US" dirty="0">
+              <a:solidFill>
+                <a:schemeClr val="bg1">
+                  <a:lumMod val="95000"/>
+                </a:schemeClr>
+              </a:solidFill>
+            </a:endParaRPr>
+          </a:p>
+        </p:txBody>
+      </p:sp>
+      <p:pic>
+        <p:nvPicPr>
+          <p:cNvPr id="1027" name="Picture 3" descr="C:\Users\Lazar\Desktop\01-red-question-mark1.jpg"/>
+          <p:cNvPicPr>
+            <a:picLocks noChangeAspect="1" noChangeArrowheads="1"/>
+          </p:cNvPicPr>
+          <p:nvPr/>
+        </p:nvPicPr>
+        <p:blipFill>
+          <a:blip r:embed="rId2" cstate="print">
+            <a:extLst>
+              <a:ext uri="{28A0092B-C50C-407E-A947-70E740481C1C}">
+                <a14:useLocalDpi xmlns:a14="http://schemas.microsoft.com/office/drawing/2010/main" val="0"/>
+              </a:ext>
+            </a:extLst>
+          </a:blip>
+          <a:srcRect/>
+          <a:stretch>
+            <a:fillRect/>
+          </a:stretch>
+        </p:blipFill>
+        <p:spPr bwMode="auto">
+          <a:xfrm>
+            <a:off x="3505200" y="2057400"/>
+            <a:ext cx="2419082" cy="2419082"/>
+          </a:xfrm>
+          <a:prstGeom prst="rect">
+            <a:avLst/>
+          </a:prstGeom>
+          <a:noFill/>
+          <a:extLst>
+            <a:ext uri="{909E8E84-426E-40DD-AFC4-6F175D3DCCD1}">
+              <a14:hiddenFill xmlns:a14="http://schemas.microsoft.com/office/drawing/2010/main">
+                <a:solidFill>
+                  <a:srgbClr val="FFFFFF"/>
+                </a:solidFill>
+              </a14:hiddenFill>
+            </a:ext>
+          </a:extLst>
+        </p:spPr>
+      </p:pic>
+    </p:spTree>
+    <p:extLst>
+      <p:ext uri="{BB962C8B-B14F-4D97-AF65-F5344CB8AC3E}">
+        <p14:creationId xmlns:p14="http://schemas.microsoft.com/office/powerpoint/2010/main" val="765554641"/>
       </p:ext>
     </p:extLst>
   </p:cSld>

</xml_diff>